<commit_message>
added figure model dream recall + dictionnary
</commit_message>
<xml_diff>
--- a/Fig/Intro/Intro_Guenole/Intro_Guenole.pptx
+++ b/Fig/Intro/Intro_Guenole/Intro_Guenole.pptx
@@ -4,8 +4,12 @@
   <p:sldMasterIdLst>
     <p:sldMasterId id="2147483660" r:id="rId1"/>
   </p:sldMasterIdLst>
+  <p:notesMasterIdLst>
+    <p:notesMasterId r:id="rId4"/>
+  </p:notesMasterIdLst>
   <p:sldIdLst>
     <p:sldId id="256" r:id="rId2"/>
+    <p:sldId id="258" r:id="rId3"/>
   </p:sldIdLst>
   <p:sldSz cx="6858000" cy="9906000" type="A4"/>
   <p:notesSz cx="6858000" cy="9144000"/>
@@ -107,12 +111,12 @@
   <p:extLst>
     <p:ext uri="{EFAFB233-063F-42B5-8137-9DF3F51BA10A}">
       <p15:sldGuideLst xmlns:p15="http://schemas.microsoft.com/office/powerpoint/2012/main">
-        <p15:guide id="1" orient="horz" pos="3120" userDrawn="1">
+        <p15:guide id="1" pos="3339" userDrawn="1">
           <p15:clr>
             <a:srgbClr val="A4A3A4"/>
           </p15:clr>
         </p15:guide>
-        <p15:guide id="2" pos="2160" userDrawn="1">
+        <p15:guide id="2" orient="horz" pos="3120">
           <p15:clr>
             <a:srgbClr val="A4A3A4"/>
           </p15:clr>
@@ -121,6 +125,440 @@
     </p:ext>
   </p:extLst>
 </p:presentation>
+</file>
+
+<file path=ppt/notesMasters/notesMaster1.xml><?xml version="1.0" encoding="utf-8"?>
+<p:notesMaster xmlns:a="http://schemas.openxmlformats.org/drawingml/2006/main" xmlns:r="http://schemas.openxmlformats.org/officeDocument/2006/relationships" xmlns:p="http://schemas.openxmlformats.org/presentationml/2006/main">
+  <p:cSld>
+    <p:bg>
+      <p:bgRef idx="1001">
+        <a:schemeClr val="bg1"/>
+      </p:bgRef>
+    </p:bg>
+    <p:spTree>
+      <p:nvGrpSpPr>
+        <p:cNvPr id="1" name=""/>
+        <p:cNvGrpSpPr/>
+        <p:nvPr/>
+      </p:nvGrpSpPr>
+      <p:grpSpPr>
+        <a:xfrm>
+          <a:off x="0" y="0"/>
+          <a:ext cx="0" cy="0"/>
+          <a:chOff x="0" y="0"/>
+          <a:chExt cx="0" cy="0"/>
+        </a:xfrm>
+      </p:grpSpPr>
+      <p:sp>
+        <p:nvSpPr>
+          <p:cNvPr id="2" name="Espace réservé de l'en-tête 1"/>
+          <p:cNvSpPr>
+            <a:spLocks noGrp="1"/>
+          </p:cNvSpPr>
+          <p:nvPr>
+            <p:ph type="hdr" sz="quarter"/>
+          </p:nvPr>
+        </p:nvSpPr>
+        <p:spPr>
+          <a:xfrm>
+            <a:off x="0" y="0"/>
+            <a:ext cx="2971800" cy="458788"/>
+          </a:xfrm>
+          <a:prstGeom prst="rect">
+            <a:avLst/>
+          </a:prstGeom>
+        </p:spPr>
+        <p:txBody>
+          <a:bodyPr vert="horz" lIns="91440" tIns="45720" rIns="91440" bIns="45720" rtlCol="0"/>
+          <a:lstStyle>
+            <a:lvl1pPr algn="l">
+              <a:defRPr sz="1200"/>
+            </a:lvl1pPr>
+          </a:lstStyle>
+          <a:p>
+            <a:endParaRPr lang="en-US"/>
+          </a:p>
+        </p:txBody>
+      </p:sp>
+      <p:sp>
+        <p:nvSpPr>
+          <p:cNvPr id="3" name="Espace réservé de la date 2"/>
+          <p:cNvSpPr>
+            <a:spLocks noGrp="1"/>
+          </p:cNvSpPr>
+          <p:nvPr>
+            <p:ph type="dt" idx="1"/>
+          </p:nvPr>
+        </p:nvSpPr>
+        <p:spPr>
+          <a:xfrm>
+            <a:off x="3884613" y="0"/>
+            <a:ext cx="2971800" cy="458788"/>
+          </a:xfrm>
+          <a:prstGeom prst="rect">
+            <a:avLst/>
+          </a:prstGeom>
+        </p:spPr>
+        <p:txBody>
+          <a:bodyPr vert="horz" lIns="91440" tIns="45720" rIns="91440" bIns="45720" rtlCol="0"/>
+          <a:lstStyle>
+            <a:lvl1pPr algn="r">
+              <a:defRPr sz="1200"/>
+            </a:lvl1pPr>
+          </a:lstStyle>
+          <a:p>
+            <a:fld id="{C9E36796-3BFE-4867-9ABD-08B4C222DE73}" type="datetimeFigureOut">
+              <a:rPr lang="en-US" smtClean="0"/>
+              <a:t>9/15/2017</a:t>
+            </a:fld>
+            <a:endParaRPr lang="en-US"/>
+          </a:p>
+        </p:txBody>
+      </p:sp>
+      <p:sp>
+        <p:nvSpPr>
+          <p:cNvPr id="4" name="Espace réservé de l'image des diapositives 3"/>
+          <p:cNvSpPr>
+            <a:spLocks noGrp="1" noRot="1" noChangeAspect="1"/>
+          </p:cNvSpPr>
+          <p:nvPr>
+            <p:ph type="sldImg" idx="2"/>
+          </p:nvPr>
+        </p:nvSpPr>
+        <p:spPr>
+          <a:xfrm>
+            <a:off x="2360613" y="1143000"/>
+            <a:ext cx="2136775" cy="3086100"/>
+          </a:xfrm>
+          <a:prstGeom prst="rect">
+            <a:avLst/>
+          </a:prstGeom>
+          <a:noFill/>
+          <a:ln w="12700">
+            <a:solidFill>
+              <a:prstClr val="black"/>
+            </a:solidFill>
+          </a:ln>
+        </p:spPr>
+        <p:txBody>
+          <a:bodyPr vert="horz" lIns="91440" tIns="45720" rIns="91440" bIns="45720" rtlCol="0" anchor="ctr"/>
+          <a:lstStyle/>
+          <a:p>
+            <a:endParaRPr lang="en-US"/>
+          </a:p>
+        </p:txBody>
+      </p:sp>
+      <p:sp>
+        <p:nvSpPr>
+          <p:cNvPr id="5" name="Espace réservé des commentaires 4"/>
+          <p:cNvSpPr>
+            <a:spLocks noGrp="1"/>
+          </p:cNvSpPr>
+          <p:nvPr>
+            <p:ph type="body" sz="quarter" idx="3"/>
+          </p:nvPr>
+        </p:nvSpPr>
+        <p:spPr>
+          <a:xfrm>
+            <a:off x="685800" y="4400550"/>
+            <a:ext cx="5486400" cy="3600450"/>
+          </a:xfrm>
+          <a:prstGeom prst="rect">
+            <a:avLst/>
+          </a:prstGeom>
+        </p:spPr>
+        <p:txBody>
+          <a:bodyPr vert="horz" lIns="91440" tIns="45720" rIns="91440" bIns="45720" rtlCol="0"/>
+          <a:lstStyle/>
+          <a:p>
+            <a:pPr lvl="0"/>
+            <a:r>
+              <a:rPr lang="fr-FR" smtClean="0"/>
+              <a:t>Modifiez les styles du texte du masque</a:t>
+            </a:r>
+          </a:p>
+          <a:p>
+            <a:pPr lvl="1"/>
+            <a:r>
+              <a:rPr lang="fr-FR" smtClean="0"/>
+              <a:t>Deuxième niveau</a:t>
+            </a:r>
+          </a:p>
+          <a:p>
+            <a:pPr lvl="2"/>
+            <a:r>
+              <a:rPr lang="fr-FR" smtClean="0"/>
+              <a:t>Troisième niveau</a:t>
+            </a:r>
+          </a:p>
+          <a:p>
+            <a:pPr lvl="3"/>
+            <a:r>
+              <a:rPr lang="fr-FR" smtClean="0"/>
+              <a:t>Quatrième niveau</a:t>
+            </a:r>
+          </a:p>
+          <a:p>
+            <a:pPr lvl="4"/>
+            <a:r>
+              <a:rPr lang="fr-FR" smtClean="0"/>
+              <a:t>Cinquième niveau</a:t>
+            </a:r>
+            <a:endParaRPr lang="en-US"/>
+          </a:p>
+        </p:txBody>
+      </p:sp>
+      <p:sp>
+        <p:nvSpPr>
+          <p:cNvPr id="6" name="Espace réservé du pied de page 5"/>
+          <p:cNvSpPr>
+            <a:spLocks noGrp="1"/>
+          </p:cNvSpPr>
+          <p:nvPr>
+            <p:ph type="ftr" sz="quarter" idx="4"/>
+          </p:nvPr>
+        </p:nvSpPr>
+        <p:spPr>
+          <a:xfrm>
+            <a:off x="0" y="8685213"/>
+            <a:ext cx="2971800" cy="458787"/>
+          </a:xfrm>
+          <a:prstGeom prst="rect">
+            <a:avLst/>
+          </a:prstGeom>
+        </p:spPr>
+        <p:txBody>
+          <a:bodyPr vert="horz" lIns="91440" tIns="45720" rIns="91440" bIns="45720" rtlCol="0" anchor="b"/>
+          <a:lstStyle>
+            <a:lvl1pPr algn="l">
+              <a:defRPr sz="1200"/>
+            </a:lvl1pPr>
+          </a:lstStyle>
+          <a:p>
+            <a:endParaRPr lang="en-US"/>
+          </a:p>
+        </p:txBody>
+      </p:sp>
+      <p:sp>
+        <p:nvSpPr>
+          <p:cNvPr id="7" name="Espace réservé du numéro de diapositive 6"/>
+          <p:cNvSpPr>
+            <a:spLocks noGrp="1"/>
+          </p:cNvSpPr>
+          <p:nvPr>
+            <p:ph type="sldNum" sz="quarter" idx="5"/>
+          </p:nvPr>
+        </p:nvSpPr>
+        <p:spPr>
+          <a:xfrm>
+            <a:off x="3884613" y="8685213"/>
+            <a:ext cx="2971800" cy="458787"/>
+          </a:xfrm>
+          <a:prstGeom prst="rect">
+            <a:avLst/>
+          </a:prstGeom>
+        </p:spPr>
+        <p:txBody>
+          <a:bodyPr vert="horz" lIns="91440" tIns="45720" rIns="91440" bIns="45720" rtlCol="0" anchor="b"/>
+          <a:lstStyle>
+            <a:lvl1pPr algn="r">
+              <a:defRPr sz="1200"/>
+            </a:lvl1pPr>
+          </a:lstStyle>
+          <a:p>
+            <a:fld id="{B61A2C82-51D9-4A92-8134-6523EF785003}" type="slidenum">
+              <a:rPr lang="en-US" smtClean="0"/>
+              <a:t>‹N°›</a:t>
+            </a:fld>
+            <a:endParaRPr lang="en-US"/>
+          </a:p>
+        </p:txBody>
+      </p:sp>
+    </p:spTree>
+    <p:extLst>
+      <p:ext uri="{BB962C8B-B14F-4D97-AF65-F5344CB8AC3E}">
+        <p14:creationId xmlns:p14="http://schemas.microsoft.com/office/powerpoint/2010/main" val="2033611930"/>
+      </p:ext>
+    </p:extLst>
+  </p:cSld>
+  <p:clrMap bg1="lt1" tx1="dk1" bg2="lt2" tx2="dk2" accent1="accent1" accent2="accent2" accent3="accent3" accent4="accent4" accent5="accent5" accent6="accent6" hlink="hlink" folHlink="folHlink"/>
+  <p:notesStyle>
+    <a:lvl1pPr marL="0" algn="l" defTabSz="914400" rtl="0" eaLnBrk="1" latinLnBrk="0" hangingPunct="1">
+      <a:defRPr sz="1200" kern="1200">
+        <a:solidFill>
+          <a:schemeClr val="tx1"/>
+        </a:solidFill>
+        <a:latin typeface="+mn-lt"/>
+        <a:ea typeface="+mn-ea"/>
+        <a:cs typeface="+mn-cs"/>
+      </a:defRPr>
+    </a:lvl1pPr>
+    <a:lvl2pPr marL="457200" algn="l" defTabSz="914400" rtl="0" eaLnBrk="1" latinLnBrk="0" hangingPunct="1">
+      <a:defRPr sz="1200" kern="1200">
+        <a:solidFill>
+          <a:schemeClr val="tx1"/>
+        </a:solidFill>
+        <a:latin typeface="+mn-lt"/>
+        <a:ea typeface="+mn-ea"/>
+        <a:cs typeface="+mn-cs"/>
+      </a:defRPr>
+    </a:lvl2pPr>
+    <a:lvl3pPr marL="914400" algn="l" defTabSz="914400" rtl="0" eaLnBrk="1" latinLnBrk="0" hangingPunct="1">
+      <a:defRPr sz="1200" kern="1200">
+        <a:solidFill>
+          <a:schemeClr val="tx1"/>
+        </a:solidFill>
+        <a:latin typeface="+mn-lt"/>
+        <a:ea typeface="+mn-ea"/>
+        <a:cs typeface="+mn-cs"/>
+      </a:defRPr>
+    </a:lvl3pPr>
+    <a:lvl4pPr marL="1371600" algn="l" defTabSz="914400" rtl="0" eaLnBrk="1" latinLnBrk="0" hangingPunct="1">
+      <a:defRPr sz="1200" kern="1200">
+        <a:solidFill>
+          <a:schemeClr val="tx1"/>
+        </a:solidFill>
+        <a:latin typeface="+mn-lt"/>
+        <a:ea typeface="+mn-ea"/>
+        <a:cs typeface="+mn-cs"/>
+      </a:defRPr>
+    </a:lvl4pPr>
+    <a:lvl5pPr marL="1828800" algn="l" defTabSz="914400" rtl="0" eaLnBrk="1" latinLnBrk="0" hangingPunct="1">
+      <a:defRPr sz="1200" kern="1200">
+        <a:solidFill>
+          <a:schemeClr val="tx1"/>
+        </a:solidFill>
+        <a:latin typeface="+mn-lt"/>
+        <a:ea typeface="+mn-ea"/>
+        <a:cs typeface="+mn-cs"/>
+      </a:defRPr>
+    </a:lvl5pPr>
+    <a:lvl6pPr marL="2286000" algn="l" defTabSz="914400" rtl="0" eaLnBrk="1" latinLnBrk="0" hangingPunct="1">
+      <a:defRPr sz="1200" kern="1200">
+        <a:solidFill>
+          <a:schemeClr val="tx1"/>
+        </a:solidFill>
+        <a:latin typeface="+mn-lt"/>
+        <a:ea typeface="+mn-ea"/>
+        <a:cs typeface="+mn-cs"/>
+      </a:defRPr>
+    </a:lvl6pPr>
+    <a:lvl7pPr marL="2743200" algn="l" defTabSz="914400" rtl="0" eaLnBrk="1" latinLnBrk="0" hangingPunct="1">
+      <a:defRPr sz="1200" kern="1200">
+        <a:solidFill>
+          <a:schemeClr val="tx1"/>
+        </a:solidFill>
+        <a:latin typeface="+mn-lt"/>
+        <a:ea typeface="+mn-ea"/>
+        <a:cs typeface="+mn-cs"/>
+      </a:defRPr>
+    </a:lvl7pPr>
+    <a:lvl8pPr marL="3200400" algn="l" defTabSz="914400" rtl="0" eaLnBrk="1" latinLnBrk="0" hangingPunct="1">
+      <a:defRPr sz="1200" kern="1200">
+        <a:solidFill>
+          <a:schemeClr val="tx1"/>
+        </a:solidFill>
+        <a:latin typeface="+mn-lt"/>
+        <a:ea typeface="+mn-ea"/>
+        <a:cs typeface="+mn-cs"/>
+      </a:defRPr>
+    </a:lvl8pPr>
+    <a:lvl9pPr marL="3657600" algn="l" defTabSz="914400" rtl="0" eaLnBrk="1" latinLnBrk="0" hangingPunct="1">
+      <a:defRPr sz="1200" kern="1200">
+        <a:solidFill>
+          <a:schemeClr val="tx1"/>
+        </a:solidFill>
+        <a:latin typeface="+mn-lt"/>
+        <a:ea typeface="+mn-ea"/>
+        <a:cs typeface="+mn-cs"/>
+      </a:defRPr>
+    </a:lvl9pPr>
+  </p:notesStyle>
+</p:notesMaster>
+</file>
+
+<file path=ppt/notesSlides/notesSlide1.xml><?xml version="1.0" encoding="utf-8"?>
+<p:notes xmlns:a="http://schemas.openxmlformats.org/drawingml/2006/main" xmlns:r="http://schemas.openxmlformats.org/officeDocument/2006/relationships" xmlns:p="http://schemas.openxmlformats.org/presentationml/2006/main">
+  <p:cSld>
+    <p:spTree>
+      <p:nvGrpSpPr>
+        <p:cNvPr id="1" name=""/>
+        <p:cNvGrpSpPr/>
+        <p:nvPr/>
+      </p:nvGrpSpPr>
+      <p:grpSpPr>
+        <a:xfrm>
+          <a:off x="0" y="0"/>
+          <a:ext cx="0" cy="0"/>
+          <a:chOff x="0" y="0"/>
+          <a:chExt cx="0" cy="0"/>
+        </a:xfrm>
+      </p:grpSpPr>
+      <p:sp>
+        <p:nvSpPr>
+          <p:cNvPr id="2" name="Espace réservé de l'image des diapositives 1"/>
+          <p:cNvSpPr>
+            <a:spLocks noGrp="1" noRot="1" noChangeAspect="1"/>
+          </p:cNvSpPr>
+          <p:nvPr>
+            <p:ph type="sldImg"/>
+          </p:nvPr>
+        </p:nvSpPr>
+        <p:spPr/>
+      </p:sp>
+      <p:sp>
+        <p:nvSpPr>
+          <p:cNvPr id="3" name="Espace réservé des commentaires 2"/>
+          <p:cNvSpPr>
+            <a:spLocks noGrp="1"/>
+          </p:cNvSpPr>
+          <p:nvPr>
+            <p:ph type="body" idx="1"/>
+          </p:nvPr>
+        </p:nvSpPr>
+        <p:spPr/>
+        <p:txBody>
+          <a:bodyPr/>
+          <a:lstStyle/>
+          <a:p>
+            <a:endParaRPr lang="en-US" dirty="0"/>
+          </a:p>
+        </p:txBody>
+      </p:sp>
+      <p:sp>
+        <p:nvSpPr>
+          <p:cNvPr id="4" name="Espace réservé du numéro de diapositive 3"/>
+          <p:cNvSpPr>
+            <a:spLocks noGrp="1"/>
+          </p:cNvSpPr>
+          <p:nvPr>
+            <p:ph type="sldNum" sz="quarter" idx="10"/>
+          </p:nvPr>
+        </p:nvSpPr>
+        <p:spPr/>
+        <p:txBody>
+          <a:bodyPr/>
+          <a:lstStyle/>
+          <a:p>
+            <a:fld id="{B61A2C82-51D9-4A92-8134-6523EF785003}" type="slidenum">
+              <a:rPr lang="en-US" smtClean="0"/>
+              <a:t>2</a:t>
+            </a:fld>
+            <a:endParaRPr lang="en-US"/>
+          </a:p>
+        </p:txBody>
+      </p:sp>
+    </p:spTree>
+    <p:extLst>
+      <p:ext uri="{BB962C8B-B14F-4D97-AF65-F5344CB8AC3E}">
+        <p14:creationId xmlns:p14="http://schemas.microsoft.com/office/powerpoint/2010/main" val="2360881093"/>
+      </p:ext>
+    </p:extLst>
+  </p:cSld>
+  <p:clrMapOvr>
+    <a:masterClrMapping/>
+  </p:clrMapOvr>
+</p:notes>
 </file>
 
 <file path=ppt/slideLayouts/slideLayout1.xml><?xml version="1.0" encoding="utf-8"?>
@@ -254,7 +692,7 @@
           <a:p>
             <a:fld id="{FFCA3A82-EC32-4B49-BF0B-8FC2564EDB60}" type="datetimeFigureOut">
               <a:rPr lang="en-US" smtClean="0"/>
-              <a:t>8/10/2017</a:t>
+              <a:t>9/15/2017</a:t>
             </a:fld>
             <a:endParaRPr lang="en-US"/>
           </a:p>
@@ -424,7 +862,7 @@
           <a:p>
             <a:fld id="{FFCA3A82-EC32-4B49-BF0B-8FC2564EDB60}" type="datetimeFigureOut">
               <a:rPr lang="en-US" smtClean="0"/>
-              <a:t>8/10/2017</a:t>
+              <a:t>9/15/2017</a:t>
             </a:fld>
             <a:endParaRPr lang="en-US"/>
           </a:p>
@@ -604,7 +1042,7 @@
           <a:p>
             <a:fld id="{FFCA3A82-EC32-4B49-BF0B-8FC2564EDB60}" type="datetimeFigureOut">
               <a:rPr lang="en-US" smtClean="0"/>
-              <a:t>8/10/2017</a:t>
+              <a:t>9/15/2017</a:t>
             </a:fld>
             <a:endParaRPr lang="en-US"/>
           </a:p>
@@ -774,7 +1212,7 @@
           <a:p>
             <a:fld id="{FFCA3A82-EC32-4B49-BF0B-8FC2564EDB60}" type="datetimeFigureOut">
               <a:rPr lang="en-US" smtClean="0"/>
-              <a:t>8/10/2017</a:t>
+              <a:t>9/15/2017</a:t>
             </a:fld>
             <a:endParaRPr lang="en-US"/>
           </a:p>
@@ -1018,7 +1456,7 @@
           <a:p>
             <a:fld id="{FFCA3A82-EC32-4B49-BF0B-8FC2564EDB60}" type="datetimeFigureOut">
               <a:rPr lang="en-US" smtClean="0"/>
-              <a:t>8/10/2017</a:t>
+              <a:t>9/15/2017</a:t>
             </a:fld>
             <a:endParaRPr lang="en-US"/>
           </a:p>
@@ -1250,7 +1688,7 @@
           <a:p>
             <a:fld id="{FFCA3A82-EC32-4B49-BF0B-8FC2564EDB60}" type="datetimeFigureOut">
               <a:rPr lang="en-US" smtClean="0"/>
-              <a:t>8/10/2017</a:t>
+              <a:t>9/15/2017</a:t>
             </a:fld>
             <a:endParaRPr lang="en-US"/>
           </a:p>
@@ -1617,7 +2055,7 @@
           <a:p>
             <a:fld id="{FFCA3A82-EC32-4B49-BF0B-8FC2564EDB60}" type="datetimeFigureOut">
               <a:rPr lang="en-US" smtClean="0"/>
-              <a:t>8/10/2017</a:t>
+              <a:t>9/15/2017</a:t>
             </a:fld>
             <a:endParaRPr lang="en-US"/>
           </a:p>
@@ -1735,7 +2173,7 @@
           <a:p>
             <a:fld id="{FFCA3A82-EC32-4B49-BF0B-8FC2564EDB60}" type="datetimeFigureOut">
               <a:rPr lang="en-US" smtClean="0"/>
-              <a:t>8/10/2017</a:t>
+              <a:t>9/15/2017</a:t>
             </a:fld>
             <a:endParaRPr lang="en-US"/>
           </a:p>
@@ -1830,7 +2268,7 @@
           <a:p>
             <a:fld id="{FFCA3A82-EC32-4B49-BF0B-8FC2564EDB60}" type="datetimeFigureOut">
               <a:rPr lang="en-US" smtClean="0"/>
-              <a:t>8/10/2017</a:t>
+              <a:t>9/15/2017</a:t>
             </a:fld>
             <a:endParaRPr lang="en-US"/>
           </a:p>
@@ -2107,7 +2545,7 @@
           <a:p>
             <a:fld id="{FFCA3A82-EC32-4B49-BF0B-8FC2564EDB60}" type="datetimeFigureOut">
               <a:rPr lang="en-US" smtClean="0"/>
-              <a:t>8/10/2017</a:t>
+              <a:t>9/15/2017</a:t>
             </a:fld>
             <a:endParaRPr lang="en-US"/>
           </a:p>
@@ -2364,7 +2802,7 @@
           <a:p>
             <a:fld id="{FFCA3A82-EC32-4B49-BF0B-8FC2564EDB60}" type="datetimeFigureOut">
               <a:rPr lang="en-US" smtClean="0"/>
-              <a:t>8/10/2017</a:t>
+              <a:t>9/15/2017</a:t>
             </a:fld>
             <a:endParaRPr lang="en-US"/>
           </a:p>
@@ -2577,7 +3015,7 @@
           <a:p>
             <a:fld id="{FFCA3A82-EC32-4B49-BF0B-8FC2564EDB60}" type="datetimeFigureOut">
               <a:rPr lang="en-US" smtClean="0"/>
-              <a:t>8/10/2017</a:t>
+              <a:t>9/15/2017</a:t>
             </a:fld>
             <a:endParaRPr lang="en-US"/>
           </a:p>
@@ -3319,6 +3757,1107 @@
 </p:sld>
 </file>
 
+<file path=ppt/slides/slide2.xml><?xml version="1.0" encoding="utf-8"?>
+<p:sld xmlns:a="http://schemas.openxmlformats.org/drawingml/2006/main" xmlns:r="http://schemas.openxmlformats.org/officeDocument/2006/relationships" xmlns:p="http://schemas.openxmlformats.org/presentationml/2006/main">
+  <p:cSld>
+    <p:spTree>
+      <p:nvGrpSpPr>
+        <p:cNvPr id="1" name=""/>
+        <p:cNvGrpSpPr/>
+        <p:nvPr/>
+      </p:nvGrpSpPr>
+      <p:grpSpPr>
+        <a:xfrm>
+          <a:off x="0" y="0"/>
+          <a:ext cx="0" cy="0"/>
+          <a:chOff x="0" y="0"/>
+          <a:chExt cx="0" cy="0"/>
+        </a:xfrm>
+      </p:grpSpPr>
+      <p:cxnSp>
+        <p:nvCxnSpPr>
+          <p:cNvPr id="33" name="Connecteur droit avec flèche 32"/>
+          <p:cNvCxnSpPr/>
+          <p:nvPr/>
+        </p:nvCxnSpPr>
+        <p:spPr>
+          <a:xfrm flipH="1">
+            <a:off x="3520867" y="2694551"/>
+            <a:ext cx="803306" cy="1709464"/>
+          </a:xfrm>
+          <a:prstGeom prst="straightConnector1">
+            <a:avLst/>
+          </a:prstGeom>
+          <a:ln w="12700">
+            <a:solidFill>
+              <a:schemeClr val="tx1"/>
+            </a:solidFill>
+            <a:prstDash val="sysDash"/>
+            <a:tailEnd type="triangle"/>
+          </a:ln>
+        </p:spPr>
+        <p:style>
+          <a:lnRef idx="1">
+            <a:schemeClr val="accent1"/>
+          </a:lnRef>
+          <a:fillRef idx="0">
+            <a:schemeClr val="accent1"/>
+          </a:fillRef>
+          <a:effectRef idx="0">
+            <a:schemeClr val="accent1"/>
+          </a:effectRef>
+          <a:fontRef idx="minor">
+            <a:schemeClr val="tx1"/>
+          </a:fontRef>
+        </p:style>
+      </p:cxnSp>
+      <p:sp>
+        <p:nvSpPr>
+          <p:cNvPr id="4" name="Flèche droite 3"/>
+          <p:cNvSpPr/>
+          <p:nvPr/>
+        </p:nvSpPr>
+        <p:spPr>
+          <a:xfrm>
+            <a:off x="2129277" y="3611421"/>
+            <a:ext cx="2066711" cy="457200"/>
+          </a:xfrm>
+          <a:prstGeom prst="rightArrow">
+            <a:avLst/>
+          </a:prstGeom>
+          <a:gradFill flip="none" rotWithShape="1">
+            <a:gsLst>
+              <a:gs pos="42000">
+                <a:srgbClr val="222A35"/>
+              </a:gs>
+              <a:gs pos="100000">
+                <a:srgbClr val="ADB9CA"/>
+              </a:gs>
+            </a:gsLst>
+            <a:lin ang="0" scaled="1"/>
+            <a:tileRect/>
+          </a:gradFill>
+          <a:ln>
+            <a:noFill/>
+          </a:ln>
+        </p:spPr>
+        <p:style>
+          <a:lnRef idx="2">
+            <a:schemeClr val="accent1">
+              <a:shade val="50000"/>
+            </a:schemeClr>
+          </a:lnRef>
+          <a:fillRef idx="1">
+            <a:schemeClr val="accent1"/>
+          </a:fillRef>
+          <a:effectRef idx="0">
+            <a:schemeClr val="accent1"/>
+          </a:effectRef>
+          <a:fontRef idx="minor">
+            <a:schemeClr val="lt1"/>
+          </a:fontRef>
+        </p:style>
+        <p:txBody>
+          <a:bodyPr rtlCol="0" anchor="ctr"/>
+          <a:lstStyle/>
+          <a:p>
+            <a:pPr algn="ctr"/>
+            <a:endParaRPr lang="en-US"/>
+          </a:p>
+        </p:txBody>
+      </p:sp>
+      <p:sp>
+        <p:nvSpPr>
+          <p:cNvPr id="5" name="Rectangle 4"/>
+          <p:cNvSpPr/>
+          <p:nvPr/>
+        </p:nvSpPr>
+        <p:spPr>
+          <a:xfrm>
+            <a:off x="737834" y="2940021"/>
+            <a:ext cx="1332000" cy="1800000"/>
+          </a:xfrm>
+          <a:prstGeom prst="rect">
+            <a:avLst/>
+          </a:prstGeom>
+          <a:solidFill>
+            <a:schemeClr val="tx2">
+              <a:lumMod val="50000"/>
+            </a:schemeClr>
+          </a:solidFill>
+          <a:ln>
+            <a:solidFill>
+              <a:schemeClr val="bg1"/>
+            </a:solidFill>
+          </a:ln>
+        </p:spPr>
+        <p:style>
+          <a:lnRef idx="2">
+            <a:schemeClr val="accent1">
+              <a:shade val="50000"/>
+            </a:schemeClr>
+          </a:lnRef>
+          <a:fillRef idx="1">
+            <a:schemeClr val="accent1"/>
+          </a:fillRef>
+          <a:effectRef idx="0">
+            <a:schemeClr val="accent1"/>
+          </a:effectRef>
+          <a:fontRef idx="minor">
+            <a:schemeClr val="lt1"/>
+          </a:fontRef>
+        </p:style>
+        <p:txBody>
+          <a:bodyPr rtlCol="0" anchor="ctr"/>
+          <a:lstStyle/>
+          <a:p>
+            <a:pPr algn="ctr"/>
+            <a:r>
+              <a:rPr lang="en-US" sz="1600" dirty="0" smtClean="0">
+                <a:latin typeface="Helvetica" pitchFamily="2" charset="0"/>
+                <a:ea typeface="Open Sans" panose="020B0606030504020204" pitchFamily="34" charset="0"/>
+                <a:cs typeface="Open Sans" panose="020B0606030504020204" pitchFamily="34" charset="0"/>
+              </a:rPr>
+              <a:t>Dream experience</a:t>
+            </a:r>
+            <a:endParaRPr lang="en-US" sz="1600" dirty="0">
+              <a:latin typeface="Helvetica" pitchFamily="2" charset="0"/>
+              <a:ea typeface="Open Sans" panose="020B0606030504020204" pitchFamily="34" charset="0"/>
+              <a:cs typeface="Open Sans" panose="020B0606030504020204" pitchFamily="34" charset="0"/>
+            </a:endParaRPr>
+          </a:p>
+        </p:txBody>
+      </p:sp>
+      <p:sp>
+        <p:nvSpPr>
+          <p:cNvPr id="9" name="Rectangle 8"/>
+          <p:cNvSpPr/>
+          <p:nvPr/>
+        </p:nvSpPr>
+        <p:spPr>
+          <a:xfrm>
+            <a:off x="4251006" y="3121531"/>
+            <a:ext cx="1332000" cy="1440000"/>
+          </a:xfrm>
+          <a:prstGeom prst="rect">
+            <a:avLst/>
+          </a:prstGeom>
+          <a:solidFill>
+            <a:schemeClr val="tx2">
+              <a:lumMod val="40000"/>
+              <a:lumOff val="60000"/>
+            </a:schemeClr>
+          </a:solidFill>
+          <a:ln>
+            <a:noFill/>
+          </a:ln>
+        </p:spPr>
+        <p:style>
+          <a:lnRef idx="2">
+            <a:schemeClr val="accent1">
+              <a:shade val="50000"/>
+            </a:schemeClr>
+          </a:lnRef>
+          <a:fillRef idx="1">
+            <a:schemeClr val="accent1"/>
+          </a:fillRef>
+          <a:effectRef idx="0">
+            <a:schemeClr val="accent1"/>
+          </a:effectRef>
+          <a:fontRef idx="minor">
+            <a:schemeClr val="lt1"/>
+          </a:fontRef>
+        </p:style>
+        <p:txBody>
+          <a:bodyPr rtlCol="0" anchor="ctr"/>
+          <a:lstStyle/>
+          <a:p>
+            <a:pPr algn="ctr"/>
+            <a:r>
+              <a:rPr lang="en-US" sz="1600" dirty="0" smtClean="0">
+                <a:solidFill>
+                  <a:schemeClr val="tx1"/>
+                </a:solidFill>
+                <a:latin typeface="Helvetica" pitchFamily="2" charset="0"/>
+                <a:ea typeface="Open Sans" panose="020B0606030504020204" pitchFamily="34" charset="0"/>
+                <a:cs typeface="Open Sans" panose="020B0606030504020204" pitchFamily="34" charset="0"/>
+              </a:rPr>
+              <a:t>Dream recall</a:t>
+            </a:r>
+            <a:endParaRPr lang="en-US" sz="1600" dirty="0">
+              <a:solidFill>
+                <a:schemeClr val="tx1"/>
+              </a:solidFill>
+              <a:latin typeface="Helvetica" pitchFamily="2" charset="0"/>
+              <a:ea typeface="Open Sans" panose="020B0606030504020204" pitchFamily="34" charset="0"/>
+              <a:cs typeface="Open Sans" panose="020B0606030504020204" pitchFamily="34" charset="0"/>
+            </a:endParaRPr>
+          </a:p>
+        </p:txBody>
+      </p:sp>
+      <p:sp>
+        <p:nvSpPr>
+          <p:cNvPr id="11" name="ZoneTexte 10"/>
+          <p:cNvSpPr txBox="1"/>
+          <p:nvPr/>
+        </p:nvSpPr>
+        <p:spPr>
+          <a:xfrm>
+            <a:off x="2124851" y="3709216"/>
+            <a:ext cx="2071135" cy="261610"/>
+          </a:xfrm>
+          <a:prstGeom prst="rect">
+            <a:avLst/>
+          </a:prstGeom>
+          <a:noFill/>
+        </p:spPr>
+        <p:txBody>
+          <a:bodyPr wrap="square" rtlCol="0">
+            <a:spAutoFit/>
+          </a:bodyPr>
+          <a:lstStyle/>
+          <a:p>
+            <a:pPr algn="ctr"/>
+            <a:r>
+              <a:rPr lang="en-US" sz="1100" i="1" dirty="0" smtClean="0">
+                <a:solidFill>
+                  <a:schemeClr val="bg1"/>
+                </a:solidFill>
+                <a:latin typeface="Helvetica" pitchFamily="2" charset="0"/>
+                <a:ea typeface="Open Sans" panose="020B0606030504020204" pitchFamily="34" charset="0"/>
+                <a:cs typeface="Open Sans" panose="020B0606030504020204" pitchFamily="34" charset="0"/>
+              </a:rPr>
+              <a:t>Memory encoding</a:t>
+            </a:r>
+            <a:endParaRPr lang="en-US" sz="1100" i="1" dirty="0">
+              <a:solidFill>
+                <a:schemeClr val="bg1"/>
+              </a:solidFill>
+              <a:latin typeface="Helvetica" pitchFamily="2" charset="0"/>
+              <a:ea typeface="Open Sans" panose="020B0606030504020204" pitchFamily="34" charset="0"/>
+              <a:cs typeface="Open Sans" panose="020B0606030504020204" pitchFamily="34" charset="0"/>
+            </a:endParaRPr>
+          </a:p>
+        </p:txBody>
+      </p:sp>
+      <p:cxnSp>
+        <p:nvCxnSpPr>
+          <p:cNvPr id="7" name="Connecteur droit avec flèche 6"/>
+          <p:cNvCxnSpPr/>
+          <p:nvPr/>
+        </p:nvCxnSpPr>
+        <p:spPr>
+          <a:xfrm flipV="1">
+            <a:off x="1092282" y="4890052"/>
+            <a:ext cx="0" cy="360000"/>
+          </a:xfrm>
+          <a:prstGeom prst="straightConnector1">
+            <a:avLst/>
+          </a:prstGeom>
+          <a:ln w="19050">
+            <a:tailEnd type="triangle"/>
+          </a:ln>
+        </p:spPr>
+        <p:style>
+          <a:lnRef idx="1">
+            <a:schemeClr val="dk1"/>
+          </a:lnRef>
+          <a:fillRef idx="0">
+            <a:schemeClr val="dk1"/>
+          </a:fillRef>
+          <a:effectRef idx="0">
+            <a:schemeClr val="dk1"/>
+          </a:effectRef>
+          <a:fontRef idx="minor">
+            <a:schemeClr val="tx1"/>
+          </a:fontRef>
+        </p:style>
+      </p:cxnSp>
+      <p:sp>
+        <p:nvSpPr>
+          <p:cNvPr id="16" name="ZoneTexte 15"/>
+          <p:cNvSpPr txBox="1"/>
+          <p:nvPr/>
+        </p:nvSpPr>
+        <p:spPr>
+          <a:xfrm>
+            <a:off x="299103" y="5270767"/>
+            <a:ext cx="1618909" cy="677108"/>
+          </a:xfrm>
+          <a:prstGeom prst="rect">
+            <a:avLst/>
+          </a:prstGeom>
+          <a:noFill/>
+        </p:spPr>
+        <p:txBody>
+          <a:bodyPr wrap="square" rtlCol="0">
+            <a:spAutoFit/>
+          </a:bodyPr>
+          <a:lstStyle/>
+          <a:p>
+            <a:pPr algn="just"/>
+            <a:r>
+              <a:rPr lang="en-US" sz="1100" b="1" dirty="0" smtClean="0">
+                <a:latin typeface="Helvetica" pitchFamily="2" charset="0"/>
+                <a:ea typeface="Open Sans" panose="020B0606030504020204" pitchFamily="34" charset="0"/>
+                <a:cs typeface="Open Sans" panose="020B0606030504020204" pitchFamily="34" charset="0"/>
+              </a:rPr>
+              <a:t>Salience hypothesis</a:t>
+            </a:r>
+          </a:p>
+          <a:p>
+            <a:pPr algn="just"/>
+            <a:r>
+              <a:rPr lang="en-US" sz="900" dirty="0" smtClean="0">
+                <a:latin typeface="Helvetica" pitchFamily="2" charset="0"/>
+                <a:ea typeface="Open Sans" panose="020B0606030504020204" pitchFamily="34" charset="0"/>
+                <a:cs typeface="Open Sans" panose="020B0606030504020204" pitchFamily="34" charset="0"/>
+              </a:rPr>
+              <a:t>Highly emotional and/or bizarre dreams will be better </a:t>
+            </a:r>
+            <a:r>
+              <a:rPr lang="en-US" sz="900" dirty="0" smtClean="0">
+                <a:latin typeface="Helvetica" pitchFamily="2" charset="0"/>
+                <a:ea typeface="Open Sans" panose="020B0606030504020204" pitchFamily="34" charset="0"/>
+                <a:cs typeface="Open Sans" panose="020B0606030504020204" pitchFamily="34" charset="0"/>
+              </a:rPr>
+              <a:t>recalled</a:t>
+            </a:r>
+            <a:endParaRPr lang="en-US" sz="900" i="1" dirty="0">
+              <a:latin typeface="Helvetica" pitchFamily="2" charset="0"/>
+              <a:ea typeface="Open Sans" panose="020B0606030504020204" pitchFamily="34" charset="0"/>
+              <a:cs typeface="Open Sans" panose="020B0606030504020204" pitchFamily="34" charset="0"/>
+            </a:endParaRPr>
+          </a:p>
+        </p:txBody>
+      </p:sp>
+      <p:cxnSp>
+        <p:nvCxnSpPr>
+          <p:cNvPr id="22" name="Connecteur droit avec flèche 21"/>
+          <p:cNvCxnSpPr/>
+          <p:nvPr/>
+        </p:nvCxnSpPr>
+        <p:spPr>
+          <a:xfrm>
+            <a:off x="1135012" y="2455266"/>
+            <a:ext cx="0" cy="360000"/>
+          </a:xfrm>
+          <a:prstGeom prst="straightConnector1">
+            <a:avLst/>
+          </a:prstGeom>
+          <a:ln w="19050">
+            <a:tailEnd type="triangle"/>
+          </a:ln>
+        </p:spPr>
+        <p:style>
+          <a:lnRef idx="1">
+            <a:schemeClr val="dk1"/>
+          </a:lnRef>
+          <a:fillRef idx="0">
+            <a:schemeClr val="dk1"/>
+          </a:fillRef>
+          <a:effectRef idx="0">
+            <a:schemeClr val="dk1"/>
+          </a:effectRef>
+          <a:fontRef idx="minor">
+            <a:schemeClr val="tx1"/>
+          </a:fontRef>
+        </p:style>
+      </p:cxnSp>
+      <p:sp>
+        <p:nvSpPr>
+          <p:cNvPr id="23" name="ZoneTexte 22"/>
+          <p:cNvSpPr txBox="1"/>
+          <p:nvPr/>
+        </p:nvSpPr>
+        <p:spPr>
+          <a:xfrm>
+            <a:off x="196170" y="1614845"/>
+            <a:ext cx="1877684" cy="815608"/>
+          </a:xfrm>
+          <a:prstGeom prst="rect">
+            <a:avLst/>
+          </a:prstGeom>
+          <a:noFill/>
+        </p:spPr>
+        <p:txBody>
+          <a:bodyPr wrap="square" rtlCol="0">
+            <a:spAutoFit/>
+          </a:bodyPr>
+          <a:lstStyle/>
+          <a:p>
+            <a:pPr algn="just"/>
+            <a:r>
+              <a:rPr lang="en-US" sz="1100" b="1" dirty="0" smtClean="0">
+                <a:latin typeface="Helvetica" pitchFamily="2" charset="0"/>
+                <a:ea typeface="Open Sans" panose="020B0606030504020204" pitchFamily="34" charset="0"/>
+                <a:cs typeface="Open Sans" panose="020B0606030504020204" pitchFamily="34" charset="0"/>
+              </a:rPr>
+              <a:t>Repression hypothesis</a:t>
+            </a:r>
+          </a:p>
+          <a:p>
+            <a:pPr algn="just"/>
+            <a:r>
+              <a:rPr lang="en-US" sz="900" dirty="0" smtClean="0">
+                <a:latin typeface="Helvetica" pitchFamily="2" charset="0"/>
+                <a:ea typeface="Open Sans" panose="020B0606030504020204" pitchFamily="34" charset="0"/>
+                <a:cs typeface="Open Sans" panose="020B0606030504020204" pitchFamily="34" charset="0"/>
+              </a:rPr>
+              <a:t>Dreams </a:t>
+            </a:r>
+            <a:r>
+              <a:rPr lang="en-US" sz="900" dirty="0">
+                <a:latin typeface="Helvetica" pitchFamily="2" charset="0"/>
+                <a:ea typeface="Open Sans" panose="020B0606030504020204" pitchFamily="34" charset="0"/>
+                <a:cs typeface="Open Sans" panose="020B0606030504020204" pitchFamily="34" charset="0"/>
+              </a:rPr>
+              <a:t>that are not </a:t>
+            </a:r>
+            <a:r>
+              <a:rPr lang="en-US" sz="900" dirty="0" smtClean="0">
+                <a:latin typeface="Helvetica" pitchFamily="2" charset="0"/>
+                <a:ea typeface="Open Sans" panose="020B0606030504020204" pitchFamily="34" charset="0"/>
+                <a:cs typeface="Open Sans" panose="020B0606030504020204" pitchFamily="34" charset="0"/>
+              </a:rPr>
+              <a:t>sufficiently disguised to pass the censor will </a:t>
+            </a:r>
+            <a:r>
+              <a:rPr lang="en-US" sz="900" dirty="0">
+                <a:latin typeface="Helvetica" pitchFamily="2" charset="0"/>
+                <a:ea typeface="Open Sans" panose="020B0606030504020204" pitchFamily="34" charset="0"/>
+                <a:cs typeface="Open Sans" panose="020B0606030504020204" pitchFamily="34" charset="0"/>
+              </a:rPr>
+              <a:t>be entirely repressed and therefore </a:t>
+            </a:r>
+            <a:r>
+              <a:rPr lang="en-US" sz="900" dirty="0" smtClean="0">
+                <a:latin typeface="Helvetica" pitchFamily="2" charset="0"/>
+                <a:ea typeface="Open Sans" panose="020B0606030504020204" pitchFamily="34" charset="0"/>
+                <a:cs typeface="Open Sans" panose="020B0606030504020204" pitchFamily="34" charset="0"/>
+              </a:rPr>
+              <a:t>forgotten</a:t>
+            </a:r>
+            <a:endParaRPr lang="en-US" sz="900" i="1" dirty="0" smtClean="0">
+              <a:latin typeface="Helvetica" pitchFamily="2" charset="0"/>
+              <a:ea typeface="Open Sans" panose="020B0606030504020204" pitchFamily="34" charset="0"/>
+              <a:cs typeface="Open Sans" panose="020B0606030504020204" pitchFamily="34" charset="0"/>
+            </a:endParaRPr>
+          </a:p>
+        </p:txBody>
+      </p:sp>
+      <p:cxnSp>
+        <p:nvCxnSpPr>
+          <p:cNvPr id="24" name="Connecteur droit avec flèche 23"/>
+          <p:cNvCxnSpPr/>
+          <p:nvPr/>
+        </p:nvCxnSpPr>
+        <p:spPr>
+          <a:xfrm>
+            <a:off x="3165791" y="3251421"/>
+            <a:ext cx="0" cy="360000"/>
+          </a:xfrm>
+          <a:prstGeom prst="straightConnector1">
+            <a:avLst/>
+          </a:prstGeom>
+          <a:ln w="19050">
+            <a:solidFill>
+              <a:srgbClr val="C00000"/>
+            </a:solidFill>
+            <a:tailEnd type="triangle"/>
+          </a:ln>
+        </p:spPr>
+        <p:style>
+          <a:lnRef idx="1">
+            <a:schemeClr val="dk1"/>
+          </a:lnRef>
+          <a:fillRef idx="0">
+            <a:schemeClr val="dk1"/>
+          </a:fillRef>
+          <a:effectRef idx="0">
+            <a:schemeClr val="dk1"/>
+          </a:effectRef>
+          <a:fontRef idx="minor">
+            <a:schemeClr val="tx1"/>
+          </a:fontRef>
+        </p:style>
+      </p:cxnSp>
+      <p:sp>
+        <p:nvSpPr>
+          <p:cNvPr id="25" name="ZoneTexte 24"/>
+          <p:cNvSpPr txBox="1"/>
+          <p:nvPr/>
+        </p:nvSpPr>
+        <p:spPr>
+          <a:xfrm>
+            <a:off x="2290727" y="1705290"/>
+            <a:ext cx="1746000" cy="1554272"/>
+          </a:xfrm>
+          <a:prstGeom prst="rect">
+            <a:avLst/>
+          </a:prstGeom>
+          <a:noFill/>
+        </p:spPr>
+        <p:txBody>
+          <a:bodyPr wrap="square" rtlCol="0">
+            <a:spAutoFit/>
+          </a:bodyPr>
+          <a:lstStyle/>
+          <a:p>
+            <a:pPr algn="just">
+              <a:spcAft>
+                <a:spcPts val="1200"/>
+              </a:spcAft>
+            </a:pPr>
+            <a:r>
+              <a:rPr lang="en-US" sz="1100" b="1" dirty="0" smtClean="0">
+                <a:latin typeface="Helvetica" pitchFamily="2" charset="0"/>
+                <a:ea typeface="Open Sans" panose="020B0606030504020204" pitchFamily="34" charset="0"/>
+                <a:cs typeface="Open Sans" panose="020B0606030504020204" pitchFamily="34" charset="0"/>
+              </a:rPr>
+              <a:t>Stage-shift hypothesis </a:t>
+            </a:r>
+            <a:r>
+              <a:rPr lang="en-US" sz="900" dirty="0" smtClean="0">
+                <a:latin typeface="Helvetica" pitchFamily="2" charset="0"/>
+                <a:ea typeface="Open Sans" panose="020B0606030504020204" pitchFamily="34" charset="0"/>
+                <a:cs typeface="Open Sans" panose="020B0606030504020204" pitchFamily="34" charset="0"/>
+              </a:rPr>
+              <a:t>Better recall in REM sleep, which is functionally closer to wakefulness than NREM </a:t>
+            </a:r>
+            <a:r>
+              <a:rPr lang="en-US" sz="900" dirty="0" smtClean="0">
+                <a:latin typeface="Helvetica" pitchFamily="2" charset="0"/>
+                <a:ea typeface="Open Sans" panose="020B0606030504020204" pitchFamily="34" charset="0"/>
+                <a:cs typeface="Open Sans" panose="020B0606030504020204" pitchFamily="34" charset="0"/>
+              </a:rPr>
+              <a:t>sleep</a:t>
+            </a:r>
+          </a:p>
+          <a:p>
+            <a:pPr algn="just"/>
+            <a:r>
+              <a:rPr lang="en-US" sz="1100" b="1" dirty="0" smtClean="0">
+                <a:solidFill>
+                  <a:srgbClr val="C00000"/>
+                </a:solidFill>
+                <a:latin typeface="Helvetica" pitchFamily="2" charset="0"/>
+                <a:ea typeface="Open Sans" panose="020B0606030504020204" pitchFamily="34" charset="0"/>
+                <a:cs typeface="Open Sans" panose="020B0606030504020204" pitchFamily="34" charset="0"/>
+              </a:rPr>
+              <a:t>Sleep </a:t>
+            </a:r>
+            <a:r>
+              <a:rPr lang="en-US" sz="1100" b="1" dirty="0" smtClean="0">
+                <a:solidFill>
+                  <a:srgbClr val="C00000"/>
+                </a:solidFill>
+                <a:latin typeface="Helvetica" pitchFamily="2" charset="0"/>
+                <a:ea typeface="Open Sans" panose="020B0606030504020204" pitchFamily="34" charset="0"/>
+                <a:cs typeface="Open Sans" panose="020B0606030504020204" pitchFamily="34" charset="0"/>
+              </a:rPr>
+              <a:t>inertia</a:t>
+            </a:r>
+          </a:p>
+          <a:p>
+            <a:pPr algn="just"/>
+            <a:r>
+              <a:rPr lang="en-US" sz="900" dirty="0" smtClean="0">
+                <a:latin typeface="Helvetica" pitchFamily="2" charset="0"/>
+                <a:ea typeface="Open Sans" panose="020B0606030504020204" pitchFamily="34" charset="0"/>
+                <a:cs typeface="Open Sans" panose="020B0606030504020204" pitchFamily="34" charset="0"/>
+              </a:rPr>
+              <a:t>Cognitive and memory abilities are impaired in the first minutes following awakening, especially from N3 sleep</a:t>
+            </a:r>
+          </a:p>
+        </p:txBody>
+      </p:sp>
+      <p:sp>
+        <p:nvSpPr>
+          <p:cNvPr id="37" name="ZoneTexte 36"/>
+          <p:cNvSpPr txBox="1"/>
+          <p:nvPr/>
+        </p:nvSpPr>
+        <p:spPr>
+          <a:xfrm>
+            <a:off x="4323393" y="5001144"/>
+            <a:ext cx="1786209" cy="1231106"/>
+          </a:xfrm>
+          <a:prstGeom prst="rect">
+            <a:avLst/>
+          </a:prstGeom>
+          <a:noFill/>
+        </p:spPr>
+        <p:txBody>
+          <a:bodyPr wrap="square" rtlCol="0">
+            <a:spAutoFit/>
+          </a:bodyPr>
+          <a:lstStyle/>
+          <a:p>
+            <a:pPr algn="just"/>
+            <a:r>
+              <a:rPr lang="en-US" sz="1100" b="1" dirty="0" smtClean="0">
+                <a:solidFill>
+                  <a:srgbClr val="C00000"/>
+                </a:solidFill>
+                <a:latin typeface="Helvetica" pitchFamily="2" charset="0"/>
+                <a:ea typeface="Open Sans" panose="020B0606030504020204" pitchFamily="34" charset="0"/>
+                <a:cs typeface="Open Sans" panose="020B0606030504020204" pitchFamily="34" charset="0"/>
+              </a:rPr>
+              <a:t>Arousal-retrieval model</a:t>
+            </a:r>
+          </a:p>
+          <a:p>
+            <a:pPr algn="just"/>
+            <a:r>
+              <a:rPr lang="en-US" sz="900" dirty="0" smtClean="0">
+                <a:latin typeface="Helvetica" pitchFamily="2" charset="0"/>
+                <a:ea typeface="Open Sans" panose="020B0606030504020204" pitchFamily="34" charset="0"/>
+                <a:cs typeface="Open Sans" panose="020B0606030504020204" pitchFamily="34" charset="0"/>
+              </a:rPr>
+              <a:t>Encoding of dream content into long-term memory is possible if </a:t>
+            </a:r>
+          </a:p>
+          <a:p>
+            <a:pPr marL="228600" indent="-228600" algn="just">
+              <a:buAutoNum type="arabicParenBoth"/>
+            </a:pPr>
+            <a:r>
+              <a:rPr lang="en-US" sz="900" dirty="0" smtClean="0">
+                <a:latin typeface="Helvetica" pitchFamily="2" charset="0"/>
+                <a:ea typeface="Open Sans" panose="020B0606030504020204" pitchFamily="34" charset="0"/>
+                <a:cs typeface="Open Sans" panose="020B0606030504020204" pitchFamily="34" charset="0"/>
+              </a:rPr>
+              <a:t>a period of wakefulness occur just </a:t>
+            </a:r>
+            <a:r>
+              <a:rPr lang="en-US" sz="900" dirty="0">
+                <a:latin typeface="Helvetica" pitchFamily="2" charset="0"/>
+                <a:ea typeface="Open Sans" panose="020B0606030504020204" pitchFamily="34" charset="0"/>
+                <a:cs typeface="Open Sans" panose="020B0606030504020204" pitchFamily="34" charset="0"/>
+              </a:rPr>
+              <a:t>after </a:t>
+            </a:r>
+            <a:r>
+              <a:rPr lang="en-US" sz="900" dirty="0" smtClean="0">
+                <a:latin typeface="Helvetica" pitchFamily="2" charset="0"/>
+                <a:ea typeface="Open Sans" panose="020B0606030504020204" pitchFamily="34" charset="0"/>
+                <a:cs typeface="Open Sans" panose="020B0606030504020204" pitchFamily="34" charset="0"/>
+              </a:rPr>
+              <a:t>dreaming</a:t>
+            </a:r>
+          </a:p>
+          <a:p>
+            <a:pPr marL="228600" indent="-228600" algn="just">
+              <a:buAutoNum type="arabicParenBoth"/>
+            </a:pPr>
+            <a:r>
+              <a:rPr lang="en-US" sz="900" dirty="0" smtClean="0">
+                <a:latin typeface="Helvetica" pitchFamily="2" charset="0"/>
+                <a:ea typeface="Open Sans" panose="020B0606030504020204" pitchFamily="34" charset="0"/>
+                <a:cs typeface="Open Sans" panose="020B0606030504020204" pitchFamily="34" charset="0"/>
+              </a:rPr>
+              <a:t>dream content is salient</a:t>
+            </a:r>
+          </a:p>
+          <a:p>
+            <a:pPr marL="228600" indent="-228600" algn="just">
+              <a:buAutoNum type="arabicParenBoth"/>
+            </a:pPr>
+            <a:r>
+              <a:rPr lang="en-US" sz="900" dirty="0" smtClean="0">
+                <a:latin typeface="Helvetica" pitchFamily="2" charset="0"/>
+                <a:ea typeface="Open Sans" panose="020B0606030504020204" pitchFamily="34" charset="0"/>
+                <a:cs typeface="Open Sans" panose="020B0606030504020204" pitchFamily="34" charset="0"/>
+              </a:rPr>
+              <a:t>no </a:t>
+            </a:r>
+            <a:r>
+              <a:rPr lang="en-US" sz="900" dirty="0" smtClean="0">
+                <a:latin typeface="Helvetica" pitchFamily="2" charset="0"/>
+                <a:ea typeface="Open Sans" panose="020B0606030504020204" pitchFamily="34" charset="0"/>
+                <a:cs typeface="Open Sans" panose="020B0606030504020204" pitchFamily="34" charset="0"/>
+              </a:rPr>
+              <a:t>interference occurs </a:t>
+            </a:r>
+            <a:r>
+              <a:rPr lang="en-US" sz="900" dirty="0" smtClean="0">
+                <a:latin typeface="Helvetica" pitchFamily="2" charset="0"/>
+                <a:ea typeface="Open Sans" panose="020B0606030504020204" pitchFamily="34" charset="0"/>
+                <a:cs typeface="Open Sans" panose="020B0606030504020204" pitchFamily="34" charset="0"/>
+              </a:rPr>
+              <a:t>during the recall </a:t>
+            </a:r>
+            <a:r>
+              <a:rPr lang="en-US" sz="900" dirty="0" smtClean="0">
+                <a:latin typeface="Helvetica" pitchFamily="2" charset="0"/>
+                <a:ea typeface="Open Sans" panose="020B0606030504020204" pitchFamily="34" charset="0"/>
+                <a:cs typeface="Open Sans" panose="020B0606030504020204" pitchFamily="34" charset="0"/>
+              </a:rPr>
+              <a:t>process</a:t>
+            </a:r>
+            <a:endParaRPr lang="en-US" sz="900" dirty="0" smtClean="0">
+              <a:latin typeface="Helvetica" pitchFamily="2" charset="0"/>
+              <a:ea typeface="Open Sans" panose="020B0606030504020204" pitchFamily="34" charset="0"/>
+              <a:cs typeface="Open Sans" panose="020B0606030504020204" pitchFamily="34" charset="0"/>
+            </a:endParaRPr>
+          </a:p>
+        </p:txBody>
+      </p:sp>
+      <p:cxnSp>
+        <p:nvCxnSpPr>
+          <p:cNvPr id="26" name="Connecteur droit avec flèche 25"/>
+          <p:cNvCxnSpPr/>
+          <p:nvPr/>
+        </p:nvCxnSpPr>
+        <p:spPr>
+          <a:xfrm flipV="1">
+            <a:off x="3165791" y="4044015"/>
+            <a:ext cx="0" cy="360000"/>
+          </a:xfrm>
+          <a:prstGeom prst="straightConnector1">
+            <a:avLst/>
+          </a:prstGeom>
+          <a:ln w="19050">
+            <a:tailEnd type="triangle"/>
+          </a:ln>
+        </p:spPr>
+        <p:style>
+          <a:lnRef idx="1">
+            <a:schemeClr val="dk1"/>
+          </a:lnRef>
+          <a:fillRef idx="0">
+            <a:schemeClr val="dk1"/>
+          </a:fillRef>
+          <a:effectRef idx="0">
+            <a:schemeClr val="dk1"/>
+          </a:effectRef>
+          <a:fontRef idx="minor">
+            <a:schemeClr val="tx1"/>
+          </a:fontRef>
+        </p:style>
+      </p:cxnSp>
+      <p:sp>
+        <p:nvSpPr>
+          <p:cNvPr id="27" name="ZoneTexte 26"/>
+          <p:cNvSpPr txBox="1"/>
+          <p:nvPr/>
+        </p:nvSpPr>
+        <p:spPr>
+          <a:xfrm>
+            <a:off x="2253819" y="4424730"/>
+            <a:ext cx="1800000" cy="1092607"/>
+          </a:xfrm>
+          <a:prstGeom prst="rect">
+            <a:avLst/>
+          </a:prstGeom>
+          <a:noFill/>
+        </p:spPr>
+        <p:txBody>
+          <a:bodyPr wrap="square" rtlCol="0">
+            <a:spAutoFit/>
+          </a:bodyPr>
+          <a:lstStyle/>
+          <a:p>
+            <a:pPr algn="just"/>
+            <a:r>
+              <a:rPr lang="en-US" sz="1100" b="1" dirty="0" smtClean="0">
+                <a:latin typeface="Helvetica" pitchFamily="2" charset="0"/>
+                <a:ea typeface="Open Sans" panose="020B0606030504020204" pitchFamily="34" charset="0"/>
+                <a:cs typeface="Open Sans" panose="020B0606030504020204" pitchFamily="34" charset="0"/>
+              </a:rPr>
+              <a:t>Interference hypothesis</a:t>
+            </a:r>
+          </a:p>
+          <a:p>
+            <a:pPr algn="just"/>
+            <a:r>
+              <a:rPr lang="en-US" sz="900" dirty="0" smtClean="0">
+                <a:latin typeface="Helvetica" pitchFamily="2" charset="0"/>
+                <a:ea typeface="Open Sans" panose="020B0606030504020204" pitchFamily="34" charset="0"/>
+                <a:cs typeface="Open Sans" panose="020B0606030504020204" pitchFamily="34" charset="0"/>
+              </a:rPr>
+              <a:t>The </a:t>
+            </a:r>
+            <a:r>
+              <a:rPr lang="en-US" sz="900" dirty="0">
+                <a:latin typeface="Helvetica" pitchFamily="2" charset="0"/>
+                <a:ea typeface="Open Sans" panose="020B0606030504020204" pitchFamily="34" charset="0"/>
+                <a:cs typeface="Open Sans" panose="020B0606030504020204" pitchFamily="34" charset="0"/>
+              </a:rPr>
+              <a:t>dream memory trace remains so long </a:t>
+            </a:r>
+            <a:r>
+              <a:rPr lang="en-US" sz="900" dirty="0" smtClean="0">
+                <a:latin typeface="Helvetica" pitchFamily="2" charset="0"/>
+                <a:ea typeface="Open Sans" panose="020B0606030504020204" pitchFamily="34" charset="0"/>
+                <a:cs typeface="Open Sans" panose="020B0606030504020204" pitchFamily="34" charset="0"/>
+              </a:rPr>
+              <a:t>as there </a:t>
+            </a:r>
+            <a:r>
+              <a:rPr lang="en-US" sz="900" dirty="0">
+                <a:latin typeface="Helvetica" pitchFamily="2" charset="0"/>
+                <a:ea typeface="Open Sans" panose="020B0606030504020204" pitchFamily="34" charset="0"/>
+                <a:cs typeface="Open Sans" panose="020B0606030504020204" pitchFamily="34" charset="0"/>
+              </a:rPr>
+              <a:t>is </a:t>
+            </a:r>
+            <a:r>
+              <a:rPr lang="en-US" sz="900" dirty="0" smtClean="0">
+                <a:latin typeface="Helvetica" pitchFamily="2" charset="0"/>
+                <a:ea typeface="Open Sans" panose="020B0606030504020204" pitchFamily="34" charset="0"/>
+                <a:cs typeface="Open Sans" panose="020B0606030504020204" pitchFamily="34" charset="0"/>
+              </a:rPr>
+              <a:t>interference (i.e. the dreamer must voluntary pay attention to the dream immediately after </a:t>
+            </a:r>
+            <a:r>
+              <a:rPr lang="en-US" sz="900" dirty="0" smtClean="0">
+                <a:latin typeface="Helvetica" pitchFamily="2" charset="0"/>
+                <a:ea typeface="Open Sans" panose="020B0606030504020204" pitchFamily="34" charset="0"/>
+                <a:cs typeface="Open Sans" panose="020B0606030504020204" pitchFamily="34" charset="0"/>
+              </a:rPr>
+              <a:t>awakening</a:t>
+            </a:r>
+            <a:r>
+              <a:rPr lang="en-US" sz="900" dirty="0">
+                <a:latin typeface="Helvetica" pitchFamily="2" charset="0"/>
+                <a:ea typeface="Open Sans" panose="020B0606030504020204" pitchFamily="34" charset="0"/>
+                <a:cs typeface="Open Sans" panose="020B0606030504020204" pitchFamily="34" charset="0"/>
+              </a:rPr>
+              <a:t>)</a:t>
+            </a:r>
+            <a:endParaRPr lang="en-US" sz="900" dirty="0">
+              <a:latin typeface="Helvetica" pitchFamily="2" charset="0"/>
+              <a:ea typeface="Open Sans" panose="020B0606030504020204" pitchFamily="34" charset="0"/>
+              <a:cs typeface="Open Sans" panose="020B0606030504020204" pitchFamily="34" charset="0"/>
+            </a:endParaRPr>
+          </a:p>
+        </p:txBody>
+      </p:sp>
+      <p:cxnSp>
+        <p:nvCxnSpPr>
+          <p:cNvPr id="30" name="Connecteur droit avec flèche 29"/>
+          <p:cNvCxnSpPr/>
+          <p:nvPr/>
+        </p:nvCxnSpPr>
+        <p:spPr>
+          <a:xfrm>
+            <a:off x="5305244" y="2694551"/>
+            <a:ext cx="0" cy="360000"/>
+          </a:xfrm>
+          <a:prstGeom prst="straightConnector1">
+            <a:avLst/>
+          </a:prstGeom>
+          <a:ln w="19050">
+            <a:tailEnd type="triangle"/>
+          </a:ln>
+        </p:spPr>
+        <p:style>
+          <a:lnRef idx="1">
+            <a:schemeClr val="dk1"/>
+          </a:lnRef>
+          <a:fillRef idx="0">
+            <a:schemeClr val="dk1"/>
+          </a:fillRef>
+          <a:effectRef idx="0">
+            <a:schemeClr val="dk1"/>
+          </a:effectRef>
+          <a:fontRef idx="minor">
+            <a:schemeClr val="tx1"/>
+          </a:fontRef>
+        </p:style>
+      </p:cxnSp>
+      <p:sp>
+        <p:nvSpPr>
+          <p:cNvPr id="31" name="ZoneTexte 30"/>
+          <p:cNvSpPr txBox="1"/>
+          <p:nvPr/>
+        </p:nvSpPr>
+        <p:spPr>
+          <a:xfrm>
+            <a:off x="4340485" y="1991737"/>
+            <a:ext cx="1932128" cy="677108"/>
+          </a:xfrm>
+          <a:prstGeom prst="rect">
+            <a:avLst/>
+          </a:prstGeom>
+          <a:noFill/>
+        </p:spPr>
+        <p:txBody>
+          <a:bodyPr wrap="square" rtlCol="0">
+            <a:spAutoFit/>
+          </a:bodyPr>
+          <a:lstStyle/>
+          <a:p>
+            <a:pPr algn="just"/>
+            <a:r>
+              <a:rPr lang="en-US" sz="1100" b="1" dirty="0" smtClean="0">
+                <a:latin typeface="Helvetica" pitchFamily="2" charset="0"/>
+                <a:ea typeface="Open Sans" panose="020B0606030504020204" pitchFamily="34" charset="0"/>
+                <a:cs typeface="Open Sans" panose="020B0606030504020204" pitchFamily="34" charset="0"/>
+              </a:rPr>
+              <a:t>Life-style hypothesis</a:t>
+            </a:r>
+          </a:p>
+          <a:p>
+            <a:pPr algn="just"/>
+            <a:r>
+              <a:rPr lang="en-US" sz="900" dirty="0">
+                <a:latin typeface="Helvetica" pitchFamily="2" charset="0"/>
+                <a:ea typeface="Open Sans" panose="020B0606030504020204" pitchFamily="34" charset="0"/>
+                <a:cs typeface="Open Sans" panose="020B0606030504020204" pitchFamily="34" charset="0"/>
+              </a:rPr>
+              <a:t>Higher interest in dreams and </a:t>
+            </a:r>
+            <a:r>
+              <a:rPr lang="en-US" sz="900" dirty="0" smtClean="0">
+                <a:latin typeface="Helvetica" pitchFamily="2" charset="0"/>
+                <a:ea typeface="Open Sans" panose="020B0606030504020204" pitchFamily="34" charset="0"/>
+                <a:cs typeface="Open Sans" panose="020B0606030504020204" pitchFamily="34" charset="0"/>
+              </a:rPr>
+              <a:t>thinner </a:t>
+            </a:r>
+            <a:r>
+              <a:rPr lang="en-US" sz="900" dirty="0">
+                <a:latin typeface="Helvetica" pitchFamily="2" charset="0"/>
+                <a:ea typeface="Open Sans" panose="020B0606030504020204" pitchFamily="34" charset="0"/>
+                <a:cs typeface="Open Sans" panose="020B0606030504020204" pitchFamily="34" charset="0"/>
+              </a:rPr>
+              <a:t>boundaries result in higher dream </a:t>
+            </a:r>
+            <a:r>
+              <a:rPr lang="en-US" sz="900" dirty="0" smtClean="0">
+                <a:latin typeface="Helvetica" pitchFamily="2" charset="0"/>
+                <a:ea typeface="Open Sans" panose="020B0606030504020204" pitchFamily="34" charset="0"/>
+                <a:cs typeface="Open Sans" panose="020B0606030504020204" pitchFamily="34" charset="0"/>
+              </a:rPr>
+              <a:t>recall</a:t>
+            </a:r>
+            <a:endParaRPr lang="en-US" sz="900" i="1" dirty="0">
+              <a:latin typeface="Helvetica" pitchFamily="2" charset="0"/>
+              <a:ea typeface="Open Sans" panose="020B0606030504020204" pitchFamily="34" charset="0"/>
+              <a:cs typeface="Open Sans" panose="020B0606030504020204" pitchFamily="34" charset="0"/>
+            </a:endParaRPr>
+          </a:p>
+        </p:txBody>
+      </p:sp>
+      <p:cxnSp>
+        <p:nvCxnSpPr>
+          <p:cNvPr id="38" name="Connecteur droit avec flèche 37"/>
+          <p:cNvCxnSpPr/>
+          <p:nvPr/>
+        </p:nvCxnSpPr>
+        <p:spPr>
+          <a:xfrm flipV="1">
+            <a:off x="5296698" y="4628125"/>
+            <a:ext cx="0" cy="360000"/>
+          </a:xfrm>
+          <a:prstGeom prst="straightConnector1">
+            <a:avLst/>
+          </a:prstGeom>
+          <a:ln w="19050">
+            <a:tailEnd type="triangle"/>
+          </a:ln>
+        </p:spPr>
+        <p:style>
+          <a:lnRef idx="1">
+            <a:schemeClr val="dk1"/>
+          </a:lnRef>
+          <a:fillRef idx="0">
+            <a:schemeClr val="dk1"/>
+          </a:fillRef>
+          <a:effectRef idx="0">
+            <a:schemeClr val="dk1"/>
+          </a:effectRef>
+          <a:fontRef idx="minor">
+            <a:schemeClr val="tx1"/>
+          </a:fontRef>
+        </p:style>
+      </p:cxnSp>
+      <p:cxnSp>
+        <p:nvCxnSpPr>
+          <p:cNvPr id="39" name="Connecteur droit avec flèche 38"/>
+          <p:cNvCxnSpPr/>
+          <p:nvPr/>
+        </p:nvCxnSpPr>
+        <p:spPr>
+          <a:xfrm flipH="1" flipV="1">
+            <a:off x="3973795" y="5435125"/>
+            <a:ext cx="264009" cy="162370"/>
+          </a:xfrm>
+          <a:prstGeom prst="straightConnector1">
+            <a:avLst/>
+          </a:prstGeom>
+          <a:ln w="12700">
+            <a:prstDash val="sysDash"/>
+            <a:tailEnd type="triangle"/>
+          </a:ln>
+        </p:spPr>
+        <p:style>
+          <a:lnRef idx="1">
+            <a:schemeClr val="dk1"/>
+          </a:lnRef>
+          <a:fillRef idx="0">
+            <a:schemeClr val="dk1"/>
+          </a:fillRef>
+          <a:effectRef idx="0">
+            <a:schemeClr val="dk1"/>
+          </a:effectRef>
+          <a:fontRef idx="minor">
+            <a:schemeClr val="tx1"/>
+          </a:fontRef>
+        </p:style>
+      </p:cxnSp>
+      <p:cxnSp>
+        <p:nvCxnSpPr>
+          <p:cNvPr id="41" name="Connecteur droit avec flèche 40"/>
+          <p:cNvCxnSpPr>
+            <a:endCxn id="16" idx="3"/>
+          </p:cNvCxnSpPr>
+          <p:nvPr/>
+        </p:nvCxnSpPr>
+        <p:spPr>
+          <a:xfrm flipH="1">
+            <a:off x="1918012" y="5597495"/>
+            <a:ext cx="2332994" cy="0"/>
+          </a:xfrm>
+          <a:prstGeom prst="straightConnector1">
+            <a:avLst/>
+          </a:prstGeom>
+          <a:ln w="12700">
+            <a:prstDash val="sysDash"/>
+            <a:tailEnd type="triangle"/>
+          </a:ln>
+        </p:spPr>
+        <p:style>
+          <a:lnRef idx="1">
+            <a:schemeClr val="dk1"/>
+          </a:lnRef>
+          <a:fillRef idx="0">
+            <a:schemeClr val="dk1"/>
+          </a:fillRef>
+          <a:effectRef idx="0">
+            <a:schemeClr val="dk1"/>
+          </a:effectRef>
+          <a:fontRef idx="minor">
+            <a:schemeClr val="tx1"/>
+          </a:fontRef>
+        </p:style>
+      </p:cxnSp>
+    </p:spTree>
+    <p:extLst>
+      <p:ext uri="{BB962C8B-B14F-4D97-AF65-F5344CB8AC3E}">
+        <p14:creationId xmlns:p14="http://schemas.microsoft.com/office/powerpoint/2010/main" val="1324010685"/>
+      </p:ext>
+    </p:extLst>
+  </p:cSld>
+  <p:clrMapOvr>
+    <a:masterClrMapping/>
+  </p:clrMapOvr>
+</p:sld>
+</file>
+
 <file path=ppt/theme/theme1.xml><?xml version="1.0" encoding="utf-8"?>
 <a:theme xmlns:a="http://schemas.openxmlformats.org/drawingml/2006/main" name="Thème Office">
   <a:themeElements>
@@ -3578,4 +5117,265 @@
     </a:ext>
   </a:extLst>
 </a:theme>
+</file>
+
+<file path=ppt/theme/theme2.xml><?xml version="1.0" encoding="utf-8"?>
+<a:theme xmlns:a="http://schemas.openxmlformats.org/drawingml/2006/main" name="Thème Office">
+  <a:themeElements>
+    <a:clrScheme name="Office">
+      <a:dk1>
+        <a:sysClr val="windowText" lastClr="000000"/>
+      </a:dk1>
+      <a:lt1>
+        <a:sysClr val="window" lastClr="FFFFFF"/>
+      </a:lt1>
+      <a:dk2>
+        <a:srgbClr val="44546A"/>
+      </a:dk2>
+      <a:lt2>
+        <a:srgbClr val="E7E6E6"/>
+      </a:lt2>
+      <a:accent1>
+        <a:srgbClr val="5B9BD5"/>
+      </a:accent1>
+      <a:accent2>
+        <a:srgbClr val="ED7D31"/>
+      </a:accent2>
+      <a:accent3>
+        <a:srgbClr val="A5A5A5"/>
+      </a:accent3>
+      <a:accent4>
+        <a:srgbClr val="FFC000"/>
+      </a:accent4>
+      <a:accent5>
+        <a:srgbClr val="4472C4"/>
+      </a:accent5>
+      <a:accent6>
+        <a:srgbClr val="70AD47"/>
+      </a:accent6>
+      <a:hlink>
+        <a:srgbClr val="0563C1"/>
+      </a:hlink>
+      <a:folHlink>
+        <a:srgbClr val="954F72"/>
+      </a:folHlink>
+    </a:clrScheme>
+    <a:fontScheme name="Office">
+      <a:majorFont>
+        <a:latin typeface="Calibri Light" panose="020F0302020204030204"/>
+        <a:ea typeface=""/>
+        <a:cs typeface=""/>
+        <a:font script="Jpan" typeface="ＭＳ Ｐゴシック"/>
+        <a:font script="Hang" typeface="맑은 고딕"/>
+        <a:font script="Hans" typeface="宋体"/>
+        <a:font script="Hant" typeface="新細明體"/>
+        <a:font script="Arab" typeface="Times New Roman"/>
+        <a:font script="Hebr" typeface="Times New Roman"/>
+        <a:font script="Thai" typeface="Angsana New"/>
+        <a:font script="Ethi" typeface="Nyala"/>
+        <a:font script="Beng" typeface="Vrinda"/>
+        <a:font script="Gujr" typeface="Shruti"/>
+        <a:font script="Khmr" typeface="MoolBoran"/>
+        <a:font script="Knda" typeface="Tunga"/>
+        <a:font script="Guru" typeface="Raavi"/>
+        <a:font script="Cans" typeface="Euphemia"/>
+        <a:font script="Cher" typeface="Plantagenet Cherokee"/>
+        <a:font script="Yiii" typeface="Microsoft Yi Baiti"/>
+        <a:font script="Tibt" typeface="Microsoft Himalaya"/>
+        <a:font script="Thaa" typeface="MV Boli"/>
+        <a:font script="Deva" typeface="Mangal"/>
+        <a:font script="Telu" typeface="Gautami"/>
+        <a:font script="Taml" typeface="Latha"/>
+        <a:font script="Syrc" typeface="Estrangelo Edessa"/>
+        <a:font script="Orya" typeface="Kalinga"/>
+        <a:font script="Mlym" typeface="Kartika"/>
+        <a:font script="Laoo" typeface="DokChampa"/>
+        <a:font script="Sinh" typeface="Iskoola Pota"/>
+        <a:font script="Mong" typeface="Mongolian Baiti"/>
+        <a:font script="Viet" typeface="Times New Roman"/>
+        <a:font script="Uigh" typeface="Microsoft Uighur"/>
+        <a:font script="Geor" typeface="Sylfaen"/>
+      </a:majorFont>
+      <a:minorFont>
+        <a:latin typeface="Calibri" panose="020F0502020204030204"/>
+        <a:ea typeface=""/>
+        <a:cs typeface=""/>
+        <a:font script="Jpan" typeface="ＭＳ Ｐゴシック"/>
+        <a:font script="Hang" typeface="맑은 고딕"/>
+        <a:font script="Hans" typeface="宋体"/>
+        <a:font script="Hant" typeface="新細明體"/>
+        <a:font script="Arab" typeface="Arial"/>
+        <a:font script="Hebr" typeface="Arial"/>
+        <a:font script="Thai" typeface="Cordia New"/>
+        <a:font script="Ethi" typeface="Nyala"/>
+        <a:font script="Beng" typeface="Vrinda"/>
+        <a:font script="Gujr" typeface="Shruti"/>
+        <a:font script="Khmr" typeface="DaunPenh"/>
+        <a:font script="Knda" typeface="Tunga"/>
+        <a:font script="Guru" typeface="Raavi"/>
+        <a:font script="Cans" typeface="Euphemia"/>
+        <a:font script="Cher" typeface="Plantagenet Cherokee"/>
+        <a:font script="Yiii" typeface="Microsoft Yi Baiti"/>
+        <a:font script="Tibt" typeface="Microsoft Himalaya"/>
+        <a:font script="Thaa" typeface="MV Boli"/>
+        <a:font script="Deva" typeface="Mangal"/>
+        <a:font script="Telu" typeface="Gautami"/>
+        <a:font script="Taml" typeface="Latha"/>
+        <a:font script="Syrc" typeface="Estrangelo Edessa"/>
+        <a:font script="Orya" typeface="Kalinga"/>
+        <a:font script="Mlym" typeface="Kartika"/>
+        <a:font script="Laoo" typeface="DokChampa"/>
+        <a:font script="Sinh" typeface="Iskoola Pota"/>
+        <a:font script="Mong" typeface="Mongolian Baiti"/>
+        <a:font script="Viet" typeface="Arial"/>
+        <a:font script="Uigh" typeface="Microsoft Uighur"/>
+        <a:font script="Geor" typeface="Sylfaen"/>
+      </a:minorFont>
+    </a:fontScheme>
+    <a:fmtScheme name="Office">
+      <a:fillStyleLst>
+        <a:solidFill>
+          <a:schemeClr val="phClr"/>
+        </a:solidFill>
+        <a:gradFill rotWithShape="1">
+          <a:gsLst>
+            <a:gs pos="0">
+              <a:schemeClr val="phClr">
+                <a:lumMod val="110000"/>
+                <a:satMod val="105000"/>
+                <a:tint val="67000"/>
+              </a:schemeClr>
+            </a:gs>
+            <a:gs pos="50000">
+              <a:schemeClr val="phClr">
+                <a:lumMod val="105000"/>
+                <a:satMod val="103000"/>
+                <a:tint val="73000"/>
+              </a:schemeClr>
+            </a:gs>
+            <a:gs pos="100000">
+              <a:schemeClr val="phClr">
+                <a:lumMod val="105000"/>
+                <a:satMod val="109000"/>
+                <a:tint val="81000"/>
+              </a:schemeClr>
+            </a:gs>
+          </a:gsLst>
+          <a:lin ang="5400000" scaled="0"/>
+        </a:gradFill>
+        <a:gradFill rotWithShape="1">
+          <a:gsLst>
+            <a:gs pos="0">
+              <a:schemeClr val="phClr">
+                <a:satMod val="103000"/>
+                <a:lumMod val="102000"/>
+                <a:tint val="94000"/>
+              </a:schemeClr>
+            </a:gs>
+            <a:gs pos="50000">
+              <a:schemeClr val="phClr">
+                <a:satMod val="110000"/>
+                <a:lumMod val="100000"/>
+                <a:shade val="100000"/>
+              </a:schemeClr>
+            </a:gs>
+            <a:gs pos="100000">
+              <a:schemeClr val="phClr">
+                <a:lumMod val="99000"/>
+                <a:satMod val="120000"/>
+                <a:shade val="78000"/>
+              </a:schemeClr>
+            </a:gs>
+          </a:gsLst>
+          <a:lin ang="5400000" scaled="0"/>
+        </a:gradFill>
+      </a:fillStyleLst>
+      <a:lnStyleLst>
+        <a:ln w="6350" cap="flat" cmpd="sng" algn="ctr">
+          <a:solidFill>
+            <a:schemeClr val="phClr"/>
+          </a:solidFill>
+          <a:prstDash val="solid"/>
+          <a:miter lim="800000"/>
+        </a:ln>
+        <a:ln w="12700" cap="flat" cmpd="sng" algn="ctr">
+          <a:solidFill>
+            <a:schemeClr val="phClr"/>
+          </a:solidFill>
+          <a:prstDash val="solid"/>
+          <a:miter lim="800000"/>
+        </a:ln>
+        <a:ln w="19050" cap="flat" cmpd="sng" algn="ctr">
+          <a:solidFill>
+            <a:schemeClr val="phClr"/>
+          </a:solidFill>
+          <a:prstDash val="solid"/>
+          <a:miter lim="800000"/>
+        </a:ln>
+      </a:lnStyleLst>
+      <a:effectStyleLst>
+        <a:effectStyle>
+          <a:effectLst/>
+        </a:effectStyle>
+        <a:effectStyle>
+          <a:effectLst/>
+        </a:effectStyle>
+        <a:effectStyle>
+          <a:effectLst>
+            <a:outerShdw blurRad="57150" dist="19050" dir="5400000" algn="ctr" rotWithShape="0">
+              <a:srgbClr val="000000">
+                <a:alpha val="63000"/>
+              </a:srgbClr>
+            </a:outerShdw>
+          </a:effectLst>
+        </a:effectStyle>
+      </a:effectStyleLst>
+      <a:bgFillStyleLst>
+        <a:solidFill>
+          <a:schemeClr val="phClr"/>
+        </a:solidFill>
+        <a:solidFill>
+          <a:schemeClr val="phClr">
+            <a:tint val="95000"/>
+            <a:satMod val="170000"/>
+          </a:schemeClr>
+        </a:solidFill>
+        <a:gradFill rotWithShape="1">
+          <a:gsLst>
+            <a:gs pos="0">
+              <a:schemeClr val="phClr">
+                <a:tint val="93000"/>
+                <a:satMod val="150000"/>
+                <a:shade val="98000"/>
+                <a:lumMod val="102000"/>
+              </a:schemeClr>
+            </a:gs>
+            <a:gs pos="50000">
+              <a:schemeClr val="phClr">
+                <a:tint val="98000"/>
+                <a:satMod val="130000"/>
+                <a:shade val="90000"/>
+                <a:lumMod val="103000"/>
+              </a:schemeClr>
+            </a:gs>
+            <a:gs pos="100000">
+              <a:schemeClr val="phClr">
+                <a:shade val="63000"/>
+                <a:satMod val="120000"/>
+              </a:schemeClr>
+            </a:gs>
+          </a:gsLst>
+          <a:lin ang="5400000" scaled="0"/>
+        </a:gradFill>
+      </a:bgFillStyleLst>
+    </a:fmtScheme>
+  </a:themeElements>
+  <a:objectDefaults/>
+  <a:extraClrSchemeLst/>
+  <a:extLst>
+    <a:ext uri="{05A4C25C-085E-4340-85A3-A5531E510DB2}">
+      <thm15:themeFamily xmlns:thm15="http://schemas.microsoft.com/office/thememl/2012/main" name="Office Theme" id="{62F939B6-93AF-4DB8-9C6B-D6C7DFDC589F}" vid="{4A3C46E8-61CC-4603-A589-7422A47A8E4A}"/>
+    </a:ext>
+  </a:extLst>
+</a:theme>
 </file>
</xml_diff>